<commit_message>
Ready for 3rd Evaluation
</commit_message>
<xml_diff>
--- a/Helmet Detection.pptx
+++ b/Helmet Detection.pptx
@@ -5,7 +5,7 @@
     <p:sldMasterId id="2147483696" r:id="rId1"/>
   </p:sldMasterIdLst>
   <p:notesMasterIdLst>
-    <p:notesMasterId r:id="rId19"/>
+    <p:notesMasterId r:id="rId28"/>
   </p:notesMasterIdLst>
   <p:sldIdLst>
     <p:sldId id="256" r:id="rId2"/>
@@ -24,7 +24,16 @@
     <p:sldId id="280" r:id="rId15"/>
     <p:sldId id="281" r:id="rId16"/>
     <p:sldId id="267" r:id="rId17"/>
-    <p:sldId id="270" r:id="rId18"/>
+    <p:sldId id="283" r:id="rId18"/>
+    <p:sldId id="282" r:id="rId19"/>
+    <p:sldId id="284" r:id="rId20"/>
+    <p:sldId id="289" r:id="rId21"/>
+    <p:sldId id="285" r:id="rId22"/>
+    <p:sldId id="286" r:id="rId23"/>
+    <p:sldId id="287" r:id="rId24"/>
+    <p:sldId id="288" r:id="rId25"/>
+    <p:sldId id="290" r:id="rId26"/>
+    <p:sldId id="291" r:id="rId27"/>
   </p:sldIdLst>
   <p:sldSz cx="9144000" cy="6858000" type="screen4x3"/>
   <p:notesSz cx="7104063" cy="10234613"/>
@@ -125,7 +134,7 @@
   </p:defaultTextStyle>
   <p:extLst>
     <p:ext uri="{EFAFB233-063F-42B5-8137-9DF3F51BA10A}">
-      <p15:sldGuideLst xmlns="" xmlns:p15="http://schemas.microsoft.com/office/powerpoint/2012/main">
+      <p15:sldGuideLst xmlns:p15="http://schemas.microsoft.com/office/powerpoint/2012/main" xmlns="">
         <p15:guide id="1" orient="horz" pos="2160">
           <p15:clr>
             <a:srgbClr val="A4A3A4"/>
@@ -225,7 +234,7 @@
             <a:fld id="{81BA2F84-D6F3-42DF-AB37-FEE65F62724E}" type="datetimeFigureOut">
               <a:rPr lang="en-US" smtClean="0"/>
               <a:pPr/>
-              <a:t>12/14/2018</a:t>
+              <a:t>3/15/2019</a:t>
             </a:fld>
             <a:endParaRPr lang="en-US"/>
           </a:p>
@@ -393,7 +402,7 @@
     </p:spTree>
     <p:extLst>
       <p:ext uri="{BB962C8B-B14F-4D97-AF65-F5344CB8AC3E}">
-        <p14:creationId xmlns="" xmlns:p14="http://schemas.microsoft.com/office/powerpoint/2010/main" val="1518573151"/>
+        <p14:creationId xmlns:p14="http://schemas.microsoft.com/office/powerpoint/2010/main" xmlns="" val="1518573151"/>
       </p:ext>
     </p:extLst>
   </p:cSld>
@@ -568,7 +577,7 @@
     </p:spTree>
     <p:extLst>
       <p:ext uri="{BB962C8B-B14F-4D97-AF65-F5344CB8AC3E}">
-        <p14:creationId xmlns="" xmlns:p14="http://schemas.microsoft.com/office/powerpoint/2010/main" val="3851919173"/>
+        <p14:creationId xmlns:p14="http://schemas.microsoft.com/office/powerpoint/2010/main" xmlns="" val="3851919173"/>
       </p:ext>
     </p:extLst>
   </p:cSld>
@@ -4857,13 +4866,26 @@
         </p:spPr>
         <p:txBody>
           <a:bodyPr>
-            <a:normAutofit fontScale="85000" lnSpcReduction="10000"/>
+            <a:normAutofit fontScale="92500" lnSpcReduction="10000"/>
           </a:bodyPr>
           <a:lstStyle/>
           <a:p>
+            <a:pPr algn="ctr"/>
             <a:r>
               <a:rPr lang="en-US" dirty="0"/>
-              <a:t>			</a:t>
+              <a:t>	</a:t>
+            </a:r>
+            <a:r>
+              <a:rPr lang="en-US" sz="2100" dirty="0" smtClean="0">
+                <a:solidFill>
+                  <a:schemeClr val="accent1">
+                    <a:lumMod val="50000"/>
+                  </a:schemeClr>
+                </a:solidFill>
+                <a:latin typeface="Times New Roman" pitchFamily="18" charset="0"/>
+                <a:cs typeface="Times New Roman" pitchFamily="18" charset="0"/>
+              </a:rPr>
+              <a:t>MENTOR </a:t>
             </a:r>
             <a:r>
               <a:rPr lang="en-US" sz="2100" dirty="0">
@@ -4875,7 +4897,7 @@
                 <a:latin typeface="Times New Roman" pitchFamily="18" charset="0"/>
                 <a:cs typeface="Times New Roman" pitchFamily="18" charset="0"/>
               </a:rPr>
-              <a:t>MENTOR : </a:t>
+              <a:t>: </a:t>
             </a:r>
             <a:r>
               <a:rPr lang="en-US" sz="2100" dirty="0" smtClean="0">
@@ -4923,6 +4945,7 @@
             </a:endParaRPr>
           </a:p>
           <a:p>
+            <a:pPr algn="ctr"/>
             <a:r>
               <a:rPr lang="en-US" sz="2100" dirty="0">
                 <a:solidFill>
@@ -4933,10 +4956,11 @@
                 <a:latin typeface="Times New Roman" pitchFamily="18" charset="0"/>
                 <a:cs typeface="Times New Roman" pitchFamily="18" charset="0"/>
               </a:rPr>
-              <a:t>ANKITA PURKAYASTHA 	 DIKSHANT MANOCHA 	     YATIN CHACHRA</a:t>
-            </a:r>
-          </a:p>
-          <a:p>
+              <a:t>	 DIKSHANT MANOCHA 	</a:t>
+            </a:r>
+          </a:p>
+          <a:p>
+            <a:pPr algn="ctr"/>
             <a:r>
               <a:rPr lang="en-US" sz="2100" dirty="0">
                 <a:solidFill>
@@ -4947,7 +4971,7 @@
                 <a:latin typeface="Times New Roman" pitchFamily="18" charset="0"/>
                 <a:cs typeface="Times New Roman" pitchFamily="18" charset="0"/>
               </a:rPr>
-              <a:t> 9915102140		    9915102071		      9915102088</a:t>
+              <a:t>		    9915102071		</a:t>
             </a:r>
           </a:p>
         </p:txBody>
@@ -5016,7 +5040,7 @@
           <a:blip r:embed="rId3">
             <a:extLst>
               <a:ext uri="{28A0092B-C50C-407E-A947-70E740481C1C}">
-                <a14:useLocalDpi xmlns="" xmlns:a14="http://schemas.microsoft.com/office/drawing/2010/main" val="0"/>
+                <a14:useLocalDpi xmlns:a14="http://schemas.microsoft.com/office/drawing/2010/main" xmlns="" val="0"/>
               </a:ext>
             </a:extLst>
           </a:blip>
@@ -5036,7 +5060,7 @@
           <a:noFill/>
           <a:extLst>
             <a:ext uri="{909E8E84-426E-40DD-AFC4-6F175D3DCCD1}">
-              <a14:hiddenFill xmlns="" xmlns:a14="http://schemas.microsoft.com/office/drawing/2010/main">
+              <a14:hiddenFill xmlns:a14="http://schemas.microsoft.com/office/drawing/2010/main" xmlns="">
                 <a:solidFill>
                   <a:srgbClr val="FFFFFF"/>
                 </a:solidFill>
@@ -5048,7 +5072,7 @@
     </p:spTree>
     <p:extLst>
       <p:ext uri="{BB962C8B-B14F-4D97-AF65-F5344CB8AC3E}">
-        <p14:creationId xmlns="" xmlns:p14="http://schemas.microsoft.com/office/powerpoint/2010/main" val="1827683543"/>
+        <p14:creationId xmlns:p14="http://schemas.microsoft.com/office/powerpoint/2010/main" xmlns="" val="1827683543"/>
       </p:ext>
     </p:extLst>
   </p:cSld>
@@ -5178,7 +5202,7 @@
           <a:blip r:embed="rId2">
             <a:extLst>
               <a:ext uri="{28A0092B-C50C-407E-A947-70E740481C1C}">
-                <a14:useLocalDpi xmlns="" xmlns:a14="http://schemas.microsoft.com/office/drawing/2010/main" val="0"/>
+                <a14:useLocalDpi xmlns:a14="http://schemas.microsoft.com/office/drawing/2010/main" xmlns="" val="0"/>
               </a:ext>
             </a:extLst>
           </a:blip>
@@ -5198,7 +5222,7 @@
           <a:noFill/>
           <a:extLst>
             <a:ext uri="{909E8E84-426E-40DD-AFC4-6F175D3DCCD1}">
-              <a14:hiddenFill xmlns="" xmlns:a14="http://schemas.microsoft.com/office/drawing/2010/main">
+              <a14:hiddenFill xmlns:a14="http://schemas.microsoft.com/office/drawing/2010/main" xmlns="">
                 <a:solidFill>
                   <a:srgbClr val="FFFFFF"/>
                 </a:solidFill>
@@ -6932,7 +6956,7 @@
     </p:spTree>
     <p:extLst>
       <p:ext uri="{BB962C8B-B14F-4D97-AF65-F5344CB8AC3E}">
-        <p14:creationId xmlns="" xmlns:p14="http://schemas.microsoft.com/office/powerpoint/2010/main" val="1318889105"/>
+        <p14:creationId xmlns:p14="http://schemas.microsoft.com/office/powerpoint/2010/main" xmlns="" val="1318889105"/>
       </p:ext>
     </p:extLst>
   </p:cSld>
@@ -6968,6 +6992,220 @@
       </p:grpSpPr>
       <p:sp>
         <p:nvSpPr>
+          <p:cNvPr id="5" name="Content Placeholder 4"/>
+          <p:cNvSpPr>
+            <a:spLocks noGrp="1"/>
+          </p:cNvSpPr>
+          <p:nvPr>
+            <p:ph sz="quarter" idx="13"/>
+          </p:nvPr>
+        </p:nvSpPr>
+        <p:spPr>
+          <a:xfrm>
+            <a:off x="814636" y="239296"/>
+            <a:ext cx="7162800" cy="1173480"/>
+          </a:xfrm>
+        </p:spPr>
+        <p:txBody>
+          <a:bodyPr>
+            <a:normAutofit/>
+          </a:bodyPr>
+          <a:lstStyle/>
+          <a:p>
+            <a:pPr marL="45720" indent="0" algn="ctr">
+              <a:buNone/>
+            </a:pPr>
+            <a:r>
+              <a:rPr lang="en-US" sz="4400" b="1" dirty="0">
+                <a:solidFill>
+                  <a:srgbClr val="C00000"/>
+                </a:solidFill>
+                <a:latin typeface="Times New Roman" pitchFamily="18" charset="0"/>
+                <a:cs typeface="Times New Roman" pitchFamily="18" charset="0"/>
+              </a:rPr>
+              <a:t>OBJECTIVE</a:t>
+            </a:r>
+          </a:p>
+        </p:txBody>
+      </p:sp>
+      <p:sp>
+        <p:nvSpPr>
+          <p:cNvPr id="6" name="Slide Number Placeholder 1"/>
+          <p:cNvSpPr>
+            <a:spLocks noGrp="1"/>
+          </p:cNvSpPr>
+          <p:nvPr>
+            <p:ph type="sldNum" sz="quarter" idx="12"/>
+          </p:nvPr>
+        </p:nvSpPr>
+        <p:spPr>
+          <a:xfrm>
+            <a:off x="3810000" y="6172200"/>
+            <a:ext cx="1828800" cy="365125"/>
+          </a:xfrm>
+        </p:spPr>
+        <p:txBody>
+          <a:bodyPr/>
+          <a:lstStyle/>
+          <a:p>
+            <a:fld id="{48BFE786-7E0B-46A5-A806-7914E4A415D7}" type="slidenum">
+              <a:rPr lang="en-US" smtClean="0"/>
+              <a:pPr/>
+              <a:t>17</a:t>
+            </a:fld>
+            <a:endParaRPr lang="en-US"/>
+          </a:p>
+        </p:txBody>
+      </p:sp>
+      <p:sp>
+        <p:nvSpPr>
+          <p:cNvPr id="7" name="TextBox 6"/>
+          <p:cNvSpPr txBox="1"/>
+          <p:nvPr/>
+        </p:nvSpPr>
+        <p:spPr>
+          <a:xfrm>
+            <a:off x="719064" y="1179040"/>
+            <a:ext cx="8424936" cy="2779351"/>
+          </a:xfrm>
+          <a:prstGeom prst="rect">
+            <a:avLst/>
+          </a:prstGeom>
+          <a:noFill/>
+        </p:spPr>
+        <p:txBody>
+          <a:bodyPr wrap="square" rtlCol="0">
+            <a:spAutoFit/>
+          </a:bodyPr>
+          <a:lstStyle/>
+          <a:p>
+            <a:pPr>
+              <a:lnSpc>
+                <a:spcPct val="150000"/>
+              </a:lnSpc>
+            </a:pPr>
+            <a:r>
+              <a:rPr lang="en-US" sz="3000" dirty="0">
+                <a:solidFill>
+                  <a:schemeClr val="tx2">
+                    <a:lumMod val="50000"/>
+                  </a:schemeClr>
+                </a:solidFill>
+                <a:latin typeface="Times New Roman" pitchFamily="18" charset="0"/>
+                <a:cs typeface="Times New Roman" pitchFamily="18" charset="0"/>
+              </a:rPr>
+              <a:t>Our aim is to penalize people riding their two wheelers without helmets using Machine Learning. </a:t>
+            </a:r>
+          </a:p>
+          <a:p>
+            <a:pPr>
+              <a:lnSpc>
+                <a:spcPct val="150000"/>
+              </a:lnSpc>
+            </a:pPr>
+            <a:r>
+              <a:rPr lang="en-US" sz="3000" dirty="0">
+                <a:solidFill>
+                  <a:schemeClr val="tx2">
+                    <a:lumMod val="50000"/>
+                  </a:schemeClr>
+                </a:solidFill>
+                <a:latin typeface="Times New Roman" pitchFamily="18" charset="0"/>
+                <a:cs typeface="Times New Roman" pitchFamily="18" charset="0"/>
+              </a:rPr>
+              <a:t/>
+            </a:r>
+            <a:br>
+              <a:rPr lang="en-US" sz="3000" dirty="0">
+                <a:solidFill>
+                  <a:schemeClr val="tx2">
+                    <a:lumMod val="50000"/>
+                  </a:schemeClr>
+                </a:solidFill>
+                <a:latin typeface="Times New Roman" pitchFamily="18" charset="0"/>
+                <a:cs typeface="Times New Roman" pitchFamily="18" charset="0"/>
+              </a:rPr>
+            </a:br>
+            <a:endParaRPr lang="en-US" sz="3000" dirty="0">
+              <a:solidFill>
+                <a:schemeClr val="tx2">
+                  <a:lumMod val="50000"/>
+                </a:schemeClr>
+              </a:solidFill>
+              <a:latin typeface="Times New Roman" pitchFamily="18" charset="0"/>
+              <a:cs typeface="Times New Roman" pitchFamily="18" charset="0"/>
+            </a:endParaRPr>
+          </a:p>
+        </p:txBody>
+      </p:sp>
+      <p:pic>
+        <p:nvPicPr>
+          <p:cNvPr id="8" name="Picture 2" descr="C:\Users\300\Desktop\blog-facial-recognition-technology-1000x671.gif"/>
+          <p:cNvPicPr>
+            <a:picLocks noChangeAspect="1" noChangeArrowheads="1"/>
+          </p:cNvPicPr>
+          <p:nvPr/>
+        </p:nvPicPr>
+        <p:blipFill>
+          <a:blip r:embed="rId2" cstate="print">
+            <a:extLst>
+              <a:ext uri="{28A0092B-C50C-407E-A947-70E740481C1C}">
+                <a14:useLocalDpi xmlns:a14="http://schemas.microsoft.com/office/drawing/2010/main" xmlns="" val="0"/>
+              </a:ext>
+            </a:extLst>
+          </a:blip>
+          <a:srcRect/>
+          <a:stretch>
+            <a:fillRect/>
+          </a:stretch>
+        </p:blipFill>
+        <p:spPr bwMode="auto">
+          <a:xfrm>
+            <a:off x="2699792" y="2996952"/>
+            <a:ext cx="3541377" cy="2376264"/>
+          </a:xfrm>
+          <a:prstGeom prst="rect">
+            <a:avLst/>
+          </a:prstGeom>
+          <a:noFill/>
+          <a:extLst>
+            <a:ext uri="{909E8E84-426E-40DD-AFC4-6F175D3DCCD1}">
+              <a14:hiddenFill xmlns:a14="http://schemas.microsoft.com/office/drawing/2010/main" xmlns="">
+                <a:solidFill>
+                  <a:srgbClr val="FFFFFF"/>
+                </a:solidFill>
+              </a14:hiddenFill>
+            </a:ext>
+          </a:extLst>
+        </p:spPr>
+      </p:pic>
+    </p:spTree>
+  </p:cSld>
+  <p:clrMapOvr>
+    <a:masterClrMapping/>
+  </p:clrMapOvr>
+</p:sld>
+</file>
+
+<file path=ppt/slides/slide18.xml><?xml version="1.0" encoding="utf-8"?>
+<p:sld xmlns:a="http://schemas.openxmlformats.org/drawingml/2006/main" xmlns:r="http://schemas.openxmlformats.org/officeDocument/2006/relationships" xmlns:p="http://schemas.openxmlformats.org/presentationml/2006/main">
+  <p:cSld>
+    <p:spTree>
+      <p:nvGrpSpPr>
+        <p:cNvPr id="1" name=""/>
+        <p:cNvGrpSpPr/>
+        <p:nvPr/>
+      </p:nvGrpSpPr>
+      <p:grpSpPr>
+        <a:xfrm>
+          <a:off x="0" y="0"/>
+          <a:ext cx="0" cy="0"/>
+          <a:chOff x="0" y="0"/>
+          <a:chExt cx="0" cy="0"/>
+        </a:xfrm>
+      </p:grpSpPr>
+      <p:sp>
+        <p:nvSpPr>
           <p:cNvPr id="2" name="Slide Number Placeholder 1"/>
           <p:cNvSpPr>
             <a:spLocks noGrp="1"/>
@@ -6984,7 +7222,7 @@
             <a:fld id="{48BFE786-7E0B-46A5-A806-7914E4A415D7}" type="slidenum">
               <a:rPr lang="en-US" smtClean="0"/>
               <a:pPr/>
-              <a:t>17</a:t>
+              <a:t>18</a:t>
             </a:fld>
             <a:endParaRPr lang="en-US"/>
           </a:p>
@@ -6992,52 +7230,45 @@
       </p:sp>
       <p:sp>
         <p:nvSpPr>
-          <p:cNvPr id="4" name="Content Placeholder 3"/>
+          <p:cNvPr id="3" name="Title 2"/>
           <p:cNvSpPr>
             <a:spLocks noGrp="1"/>
           </p:cNvSpPr>
           <p:nvPr>
-            <p:ph sz="quarter" idx="13"/>
+            <p:ph type="title"/>
           </p:nvPr>
         </p:nvSpPr>
         <p:spPr>
           <a:xfrm>
-            <a:off x="2528008" y="285728"/>
-            <a:ext cx="6400800" cy="716280"/>
+            <a:off x="2143108" y="357166"/>
+            <a:ext cx="5000660" cy="1143000"/>
           </a:xfrm>
         </p:spPr>
         <p:txBody>
-          <a:bodyPr>
-            <a:noAutofit/>
-          </a:bodyPr>
-          <a:lstStyle/>
-          <a:p>
-            <a:pPr marL="45720" indent="0">
+          <a:bodyPr/>
+          <a:lstStyle/>
+          <a:p>
+            <a:pPr algn="just">
               <a:buNone/>
             </a:pPr>
             <a:r>
-              <a:rPr lang="en-US" sz="4400" b="1" dirty="0">
-                <a:solidFill>
-                  <a:srgbClr val="C00000"/>
-                </a:solidFill>
-                <a:latin typeface="Times New Roman" pitchFamily="18" charset="0"/>
-                <a:cs typeface="Times New Roman" pitchFamily="18" charset="0"/>
-              </a:rPr>
-              <a:t>REFRENCES</a:t>
-            </a:r>
-          </a:p>
-        </p:txBody>
-      </p:sp>
-      <p:sp>
-        <p:nvSpPr>
-          <p:cNvPr id="6" name="TextBox 5"/>
-          <p:cNvSpPr txBox="1"/>
+              <a:rPr lang="en-IN" dirty="0" smtClean="0"/>
+              <a:t>Progress Report</a:t>
+            </a:r>
+            <a:endParaRPr lang="en-US" dirty="0"/>
+          </a:p>
+        </p:txBody>
+      </p:sp>
+      <p:sp>
+        <p:nvSpPr>
+          <p:cNvPr id="5" name="Rectangle 4"/>
+          <p:cNvSpPr/>
           <p:nvPr/>
         </p:nvSpPr>
         <p:spPr>
           <a:xfrm>
-            <a:off x="0" y="1412776"/>
-            <a:ext cx="9144000" cy="4154984"/>
+            <a:off x="214282" y="1285860"/>
+            <a:ext cx="3285708" cy="923330"/>
           </a:xfrm>
           <a:prstGeom prst="rect">
             <a:avLst/>
@@ -7045,168 +7276,766 @@
           <a:noFill/>
         </p:spPr>
         <p:txBody>
+          <a:bodyPr wrap="none" lIns="91440" tIns="45720" rIns="91440" bIns="45720">
+            <a:spAutoFit/>
+          </a:bodyPr>
+          <a:lstStyle/>
+          <a:p>
+            <a:pPr algn="ctr"/>
+            <a:r>
+              <a:rPr lang="en-US" sz="5400" b="1" cap="none" spc="300" dirty="0" smtClean="0">
+                <a:ln w="11430" cmpd="sng">
+                  <a:solidFill>
+                    <a:schemeClr val="accent1">
+                      <a:tint val="10000"/>
+                    </a:schemeClr>
+                  </a:solidFill>
+                  <a:prstDash val="solid"/>
+                  <a:miter lim="800000"/>
+                </a:ln>
+                <a:gradFill>
+                  <a:gsLst>
+                    <a:gs pos="10000">
+                      <a:schemeClr val="accent1">
+                        <a:tint val="83000"/>
+                        <a:shade val="100000"/>
+                        <a:satMod val="200000"/>
+                      </a:schemeClr>
+                    </a:gs>
+                    <a:gs pos="75000">
+                      <a:schemeClr val="accent1">
+                        <a:tint val="100000"/>
+                        <a:shade val="50000"/>
+                        <a:satMod val="150000"/>
+                      </a:schemeClr>
+                    </a:gs>
+                  </a:gsLst>
+                  <a:lin ang="5400000"/>
+                </a:gradFill>
+                <a:effectLst>
+                  <a:glow rad="45500">
+                    <a:schemeClr val="accent1">
+                      <a:satMod val="220000"/>
+                      <a:alpha val="35000"/>
+                    </a:schemeClr>
+                  </a:glow>
+                </a:effectLst>
+              </a:rPr>
+              <a:t>Previous</a:t>
+            </a:r>
+            <a:endParaRPr lang="en-US" sz="5400" b="1" cap="none" spc="300" dirty="0">
+              <a:ln w="11430" cmpd="sng">
+                <a:solidFill>
+                  <a:schemeClr val="accent1">
+                    <a:tint val="10000"/>
+                  </a:schemeClr>
+                </a:solidFill>
+                <a:prstDash val="solid"/>
+                <a:miter lim="800000"/>
+              </a:ln>
+              <a:gradFill>
+                <a:gsLst>
+                  <a:gs pos="10000">
+                    <a:schemeClr val="accent1">
+                      <a:tint val="83000"/>
+                      <a:shade val="100000"/>
+                      <a:satMod val="200000"/>
+                    </a:schemeClr>
+                  </a:gs>
+                  <a:gs pos="75000">
+                    <a:schemeClr val="accent1">
+                      <a:tint val="100000"/>
+                      <a:shade val="50000"/>
+                      <a:satMod val="150000"/>
+                    </a:schemeClr>
+                  </a:gs>
+                </a:gsLst>
+                <a:lin ang="5400000"/>
+              </a:gradFill>
+              <a:effectLst>
+                <a:glow rad="45500">
+                  <a:schemeClr val="accent1">
+                    <a:satMod val="220000"/>
+                    <a:alpha val="35000"/>
+                  </a:schemeClr>
+                </a:glow>
+              </a:effectLst>
+            </a:endParaRPr>
+          </a:p>
+        </p:txBody>
+      </p:sp>
+      <p:sp>
+        <p:nvSpPr>
+          <p:cNvPr id="6" name="Rectangle 5"/>
+          <p:cNvSpPr/>
+          <p:nvPr/>
+        </p:nvSpPr>
+        <p:spPr>
+          <a:xfrm>
+            <a:off x="5072066" y="1285860"/>
+            <a:ext cx="2959465" cy="923330"/>
+          </a:xfrm>
+          <a:prstGeom prst="rect">
+            <a:avLst/>
+          </a:prstGeom>
+          <a:noFill/>
+        </p:spPr>
+        <p:txBody>
+          <a:bodyPr wrap="none" lIns="91440" tIns="45720" rIns="91440" bIns="45720">
+            <a:spAutoFit/>
+          </a:bodyPr>
+          <a:lstStyle/>
+          <a:p>
+            <a:pPr algn="ctr"/>
+            <a:r>
+              <a:rPr lang="en-US" sz="5400" b="1" cap="none" spc="300" dirty="0" smtClean="0">
+                <a:ln w="11430" cmpd="sng">
+                  <a:solidFill>
+                    <a:schemeClr val="accent1">
+                      <a:tint val="10000"/>
+                    </a:schemeClr>
+                  </a:solidFill>
+                  <a:prstDash val="solid"/>
+                  <a:miter lim="800000"/>
+                </a:ln>
+                <a:gradFill>
+                  <a:gsLst>
+                    <a:gs pos="10000">
+                      <a:schemeClr val="accent1">
+                        <a:tint val="83000"/>
+                        <a:shade val="100000"/>
+                        <a:satMod val="200000"/>
+                      </a:schemeClr>
+                    </a:gs>
+                    <a:gs pos="75000">
+                      <a:schemeClr val="accent1">
+                        <a:tint val="100000"/>
+                        <a:shade val="50000"/>
+                        <a:satMod val="150000"/>
+                      </a:schemeClr>
+                    </a:gs>
+                  </a:gsLst>
+                  <a:lin ang="5400000"/>
+                </a:gradFill>
+                <a:effectLst>
+                  <a:glow rad="45500">
+                    <a:schemeClr val="accent1">
+                      <a:satMod val="220000"/>
+                      <a:alpha val="35000"/>
+                    </a:schemeClr>
+                  </a:glow>
+                </a:effectLst>
+              </a:rPr>
+              <a:t>Current</a:t>
+            </a:r>
+            <a:endParaRPr lang="en-US" sz="5400" b="1" cap="none" spc="300" dirty="0">
+              <a:ln w="11430" cmpd="sng">
+                <a:solidFill>
+                  <a:schemeClr val="accent1">
+                    <a:tint val="10000"/>
+                  </a:schemeClr>
+                </a:solidFill>
+                <a:prstDash val="solid"/>
+                <a:miter lim="800000"/>
+              </a:ln>
+              <a:gradFill>
+                <a:gsLst>
+                  <a:gs pos="10000">
+                    <a:schemeClr val="accent1">
+                      <a:tint val="83000"/>
+                      <a:shade val="100000"/>
+                      <a:satMod val="200000"/>
+                    </a:schemeClr>
+                  </a:gs>
+                  <a:gs pos="75000">
+                    <a:schemeClr val="accent1">
+                      <a:tint val="100000"/>
+                      <a:shade val="50000"/>
+                      <a:satMod val="150000"/>
+                    </a:schemeClr>
+                  </a:gs>
+                </a:gsLst>
+                <a:lin ang="5400000"/>
+              </a:gradFill>
+              <a:effectLst>
+                <a:glow rad="45500">
+                  <a:schemeClr val="accent1">
+                    <a:satMod val="220000"/>
+                    <a:alpha val="35000"/>
+                  </a:schemeClr>
+                </a:glow>
+              </a:effectLst>
+            </a:endParaRPr>
+          </a:p>
+        </p:txBody>
+      </p:sp>
+      <p:sp>
+        <p:nvSpPr>
+          <p:cNvPr id="8" name="TextBox 7"/>
+          <p:cNvSpPr txBox="1"/>
+          <p:nvPr/>
+        </p:nvSpPr>
+        <p:spPr>
+          <a:xfrm>
+            <a:off x="285720" y="2285992"/>
+            <a:ext cx="3714776" cy="3631763"/>
+          </a:xfrm>
+          <a:prstGeom prst="rect">
+            <a:avLst/>
+          </a:prstGeom>
+          <a:noFill/>
+        </p:spPr>
+        <p:txBody>
           <a:bodyPr wrap="square" rtlCol="0">
             <a:spAutoFit/>
           </a:bodyPr>
           <a:lstStyle/>
           <a:p>
-            <a:r>
-              <a:rPr lang="en-US" sz="2200" dirty="0">
-                <a:latin typeface="Times New Roman" pitchFamily="18" charset="0"/>
-                <a:cs typeface="Times New Roman" pitchFamily="18" charset="0"/>
-              </a:rPr>
-              <a:t>1. http://images.google.com/search+q=android</a:t>
-            </a:r>
-            <a:br>
-              <a:rPr lang="en-US" sz="2200" dirty="0">
-                <a:latin typeface="Times New Roman" pitchFamily="18" charset="0"/>
-                <a:cs typeface="Times New Roman" pitchFamily="18" charset="0"/>
-              </a:rPr>
-            </a:br>
-            <a:r>
-              <a:rPr lang="en-US" sz="2200" dirty="0">
-                <a:latin typeface="Times New Roman" pitchFamily="18" charset="0"/>
-                <a:cs typeface="Times New Roman" pitchFamily="18" charset="0"/>
-              </a:rPr>
-              <a:t/>
-            </a:r>
-            <a:br>
-              <a:rPr lang="en-US" sz="2200" dirty="0">
-                <a:latin typeface="Times New Roman" pitchFamily="18" charset="0"/>
-                <a:cs typeface="Times New Roman" pitchFamily="18" charset="0"/>
-              </a:rPr>
-            </a:br>
-            <a:r>
-              <a:rPr lang="en-US" sz="2200" dirty="0">
-                <a:latin typeface="Times New Roman" pitchFamily="18" charset="0"/>
-                <a:cs typeface="Times New Roman" pitchFamily="18" charset="0"/>
-              </a:rPr>
-              <a:t>2. https://opencv-python-tutroals.readthedocs.io/en/latest/py_tutorials/py_setup/py_intro/py_intro.html </a:t>
-            </a:r>
-            <a:br>
-              <a:rPr lang="en-US" sz="2200" dirty="0">
-                <a:latin typeface="Times New Roman" pitchFamily="18" charset="0"/>
-                <a:cs typeface="Times New Roman" pitchFamily="18" charset="0"/>
-              </a:rPr>
-            </a:br>
-            <a:r>
-              <a:rPr lang="en-US" sz="2200" dirty="0">
-                <a:latin typeface="Times New Roman" pitchFamily="18" charset="0"/>
-                <a:cs typeface="Times New Roman" pitchFamily="18" charset="0"/>
-              </a:rPr>
-              <a:t/>
-            </a:r>
-            <a:br>
-              <a:rPr lang="en-US" sz="2200" dirty="0">
-                <a:latin typeface="Times New Roman" pitchFamily="18" charset="0"/>
-                <a:cs typeface="Times New Roman" pitchFamily="18" charset="0"/>
-              </a:rPr>
-            </a:br>
-            <a:r>
-              <a:rPr lang="en-US" sz="2200" dirty="0">
-                <a:latin typeface="Times New Roman" pitchFamily="18" charset="0"/>
-                <a:cs typeface="Times New Roman" pitchFamily="18" charset="0"/>
-              </a:rPr>
-              <a:t>3. https://en.wikipedia.org/wiki/OpenCV </a:t>
-            </a:r>
-            <a:br>
-              <a:rPr lang="en-US" sz="2200" dirty="0">
-                <a:latin typeface="Times New Roman" pitchFamily="18" charset="0"/>
-                <a:cs typeface="Times New Roman" pitchFamily="18" charset="0"/>
-              </a:rPr>
-            </a:br>
-            <a:r>
-              <a:rPr lang="en-US" sz="2200" dirty="0">
-                <a:latin typeface="Times New Roman" pitchFamily="18" charset="0"/>
-                <a:cs typeface="Times New Roman" pitchFamily="18" charset="0"/>
-              </a:rPr>
-              <a:t/>
-            </a:r>
-            <a:br>
-              <a:rPr lang="en-US" sz="2200" dirty="0">
-                <a:latin typeface="Times New Roman" pitchFamily="18" charset="0"/>
-                <a:cs typeface="Times New Roman" pitchFamily="18" charset="0"/>
-              </a:rPr>
-            </a:br>
-            <a:r>
-              <a:rPr lang="en-US" sz="2200" dirty="0">
-                <a:latin typeface="Times New Roman" pitchFamily="18" charset="0"/>
-                <a:cs typeface="Times New Roman" pitchFamily="18" charset="0"/>
-              </a:rPr>
-              <a:t>4. . https://en.wikipedia.org/wiki/SQL</a:t>
-            </a:r>
-            <a:br>
-              <a:rPr lang="en-US" sz="2200" dirty="0">
-                <a:latin typeface="Times New Roman" pitchFamily="18" charset="0"/>
-                <a:cs typeface="Times New Roman" pitchFamily="18" charset="0"/>
-              </a:rPr>
-            </a:br>
-            <a:r>
-              <a:rPr lang="en-US" sz="2200" dirty="0">
-                <a:latin typeface="Times New Roman" pitchFamily="18" charset="0"/>
-                <a:cs typeface="Times New Roman" pitchFamily="18" charset="0"/>
-              </a:rPr>
-              <a:t/>
-            </a:r>
-            <a:br>
-              <a:rPr lang="en-US" sz="2200" dirty="0">
-                <a:latin typeface="Times New Roman" pitchFamily="18" charset="0"/>
-                <a:cs typeface="Times New Roman" pitchFamily="18" charset="0"/>
-              </a:rPr>
-            </a:br>
-            <a:r>
-              <a:rPr lang="en-US" sz="2200" dirty="0">
-                <a:latin typeface="Times New Roman" pitchFamily="18" charset="0"/>
-                <a:cs typeface="Times New Roman" pitchFamily="18" charset="0"/>
-              </a:rPr>
-              <a:t>5. http://developer.android.com/guide </a:t>
-            </a:r>
-            <a:br>
-              <a:rPr lang="en-US" sz="2200" dirty="0">
-                <a:latin typeface="Times New Roman" pitchFamily="18" charset="0"/>
-                <a:cs typeface="Times New Roman" pitchFamily="18" charset="0"/>
-              </a:rPr>
-            </a:br>
-            <a:r>
-              <a:rPr lang="en-US" sz="2200" dirty="0">
-                <a:latin typeface="Times New Roman" pitchFamily="18" charset="0"/>
-                <a:cs typeface="Times New Roman" pitchFamily="18" charset="0"/>
-              </a:rPr>
-              <a:t/>
-            </a:r>
-            <a:br>
-              <a:rPr lang="en-US" sz="2200" dirty="0">
-                <a:latin typeface="Times New Roman" pitchFamily="18" charset="0"/>
-                <a:cs typeface="Times New Roman" pitchFamily="18" charset="0"/>
-              </a:rPr>
-            </a:br>
-            <a:r>
-              <a:rPr lang="en-US" sz="2200" dirty="0">
-                <a:latin typeface="Times New Roman" pitchFamily="18" charset="0"/>
-                <a:cs typeface="Times New Roman" pitchFamily="18" charset="0"/>
-              </a:rPr>
-              <a:t>6. https://sites.ndtv.com/roadsafety/important-feature-to-you-in-your-car-5</a:t>
-            </a:r>
+            <a:pPr algn="just">
+              <a:buFont typeface="Wingdings" pitchFamily="2" charset="2"/>
+              <a:buChar char="ü"/>
+            </a:pPr>
+            <a:r>
+              <a:rPr lang="en-IN" sz="2300" dirty="0" smtClean="0">
+                <a:solidFill>
+                  <a:srgbClr val="C00000"/>
+                </a:solidFill>
+              </a:rPr>
+              <a:t> Proper Recognition of two-wheeler riders.</a:t>
+            </a:r>
+          </a:p>
+          <a:p>
+            <a:pPr algn="just">
+              <a:buFont typeface="Wingdings" pitchFamily="2" charset="2"/>
+              <a:buChar char="ü"/>
+            </a:pPr>
+            <a:r>
+              <a:rPr lang="en-IN" sz="2300" dirty="0" smtClean="0">
+                <a:solidFill>
+                  <a:srgbClr val="C00000"/>
+                </a:solidFill>
+              </a:rPr>
+              <a:t> </a:t>
+            </a:r>
+            <a:r>
+              <a:rPr lang="en-IN" sz="2300" dirty="0" smtClean="0">
+                <a:solidFill>
+                  <a:srgbClr val="C00000"/>
+                </a:solidFill>
+              </a:rPr>
+              <a:t>Detecting whether the rider is wearing the helmet or not.</a:t>
+            </a:r>
+          </a:p>
+          <a:p>
+            <a:pPr algn="just">
+              <a:buFont typeface="Wingdings" pitchFamily="2" charset="2"/>
+              <a:buChar char="ü"/>
+            </a:pPr>
+            <a:r>
+              <a:rPr lang="en-IN" sz="2300" dirty="0" smtClean="0">
+                <a:solidFill>
+                  <a:srgbClr val="C00000"/>
+                </a:solidFill>
+              </a:rPr>
+              <a:t> </a:t>
+            </a:r>
+            <a:r>
+              <a:rPr lang="en-IN" sz="2300" dirty="0" smtClean="0">
+                <a:solidFill>
+                  <a:srgbClr val="C00000"/>
+                </a:solidFill>
+              </a:rPr>
+              <a:t> If the rider is not wearing the helmet then proceeding to detect the number plate.</a:t>
+            </a:r>
+          </a:p>
+          <a:p>
+            <a:pPr algn="just">
+              <a:buFont typeface="Wingdings" pitchFamily="2" charset="2"/>
+              <a:buChar char="ü"/>
+            </a:pPr>
+            <a:endParaRPr lang="en-US" sz="2300" dirty="0">
+              <a:solidFill>
+                <a:srgbClr val="C00000"/>
+              </a:solidFill>
+            </a:endParaRPr>
+          </a:p>
+        </p:txBody>
+      </p:sp>
+      <p:cxnSp>
+        <p:nvCxnSpPr>
+          <p:cNvPr id="10" name="Straight Connector 9"/>
+          <p:cNvCxnSpPr/>
+          <p:nvPr/>
+        </p:nvCxnSpPr>
+        <p:spPr>
+          <a:xfrm rot="5400000">
+            <a:off x="2393141" y="3750471"/>
+            <a:ext cx="4214842" cy="1588"/>
+          </a:xfrm>
+          <a:prstGeom prst="line">
+            <a:avLst/>
+          </a:prstGeom>
+        </p:spPr>
+        <p:style>
+          <a:lnRef idx="1">
+            <a:schemeClr val="accent1"/>
+          </a:lnRef>
+          <a:fillRef idx="0">
+            <a:schemeClr val="accent1"/>
+          </a:fillRef>
+          <a:effectRef idx="0">
+            <a:schemeClr val="accent1"/>
+          </a:effectRef>
+          <a:fontRef idx="minor">
+            <a:schemeClr val="tx1"/>
+          </a:fontRef>
+        </p:style>
+      </p:cxnSp>
+      <p:sp>
+        <p:nvSpPr>
+          <p:cNvPr id="13" name="TextBox 12"/>
+          <p:cNvSpPr txBox="1"/>
+          <p:nvPr/>
+        </p:nvSpPr>
+        <p:spPr>
+          <a:xfrm>
+            <a:off x="5000628" y="2143116"/>
+            <a:ext cx="3643338" cy="4401205"/>
+          </a:xfrm>
+          <a:prstGeom prst="rect">
+            <a:avLst/>
+          </a:prstGeom>
+          <a:noFill/>
+        </p:spPr>
+        <p:txBody>
+          <a:bodyPr wrap="square" rtlCol="0">
+            <a:spAutoFit/>
+          </a:bodyPr>
+          <a:lstStyle/>
+          <a:p>
+            <a:pPr algn="just">
+              <a:buFont typeface="Wingdings" pitchFamily="2" charset="2"/>
+              <a:buChar char="v"/>
+            </a:pPr>
+            <a:r>
+              <a:rPr lang="en-IN" sz="2000" dirty="0" smtClean="0">
+                <a:solidFill>
+                  <a:srgbClr val="C00000"/>
+                </a:solidFill>
+              </a:rPr>
+              <a:t> Recognition of riders with and without helmet from front as well as from the side view.</a:t>
+            </a:r>
+          </a:p>
+          <a:p>
+            <a:pPr algn="just">
+              <a:buFont typeface="Wingdings" pitchFamily="2" charset="2"/>
+              <a:buChar char="v"/>
+            </a:pPr>
+            <a:r>
+              <a:rPr lang="en-IN" sz="2000" dirty="0" smtClean="0">
+                <a:solidFill>
+                  <a:srgbClr val="C00000"/>
+                </a:solidFill>
+              </a:rPr>
+              <a:t>Covering some special cases like riders wearing different caps or unsafe helmets.</a:t>
+            </a:r>
+          </a:p>
+          <a:p>
+            <a:pPr algn="just">
+              <a:buFont typeface="Wingdings" pitchFamily="2" charset="2"/>
+              <a:buChar char="v"/>
+            </a:pPr>
+            <a:r>
+              <a:rPr lang="en-IN" sz="2000" dirty="0" smtClean="0">
+                <a:solidFill>
+                  <a:srgbClr val="C00000"/>
+                </a:solidFill>
+              </a:rPr>
+              <a:t> </a:t>
+            </a:r>
+            <a:r>
+              <a:rPr lang="en-IN" sz="2000" dirty="0" smtClean="0">
+                <a:solidFill>
+                  <a:srgbClr val="C00000"/>
+                </a:solidFill>
+              </a:rPr>
+              <a:t>After recognition of the helmet rule violator proceeding to check for the number plate with IND tag.</a:t>
+            </a:r>
+          </a:p>
+          <a:p>
+            <a:pPr algn="just">
+              <a:buFont typeface="Wingdings" pitchFamily="2" charset="2"/>
+              <a:buChar char="v"/>
+            </a:pPr>
+            <a:r>
+              <a:rPr lang="en-IN" sz="2000" dirty="0" smtClean="0">
+                <a:solidFill>
+                  <a:srgbClr val="C00000"/>
+                </a:solidFill>
+              </a:rPr>
+              <a:t> </a:t>
+            </a:r>
+            <a:r>
+              <a:rPr lang="en-IN" sz="2000" dirty="0" smtClean="0">
+                <a:solidFill>
+                  <a:srgbClr val="C00000"/>
+                </a:solidFill>
+              </a:rPr>
+              <a:t>Passing the number plate to the OCR library for text extraction</a:t>
+            </a:r>
+            <a:endParaRPr lang="en-US" sz="2000" dirty="0">
+              <a:solidFill>
+                <a:srgbClr val="C00000"/>
+              </a:solidFill>
+            </a:endParaRPr>
           </a:p>
         </p:txBody>
       </p:sp>
     </p:spTree>
-    <p:extLst>
-      <p:ext uri="{BB962C8B-B14F-4D97-AF65-F5344CB8AC3E}">
-        <p14:creationId xmlns="" xmlns:p14="http://schemas.microsoft.com/office/powerpoint/2010/main" val="480492766"/>
-      </p:ext>
-    </p:extLst>
   </p:cSld>
   <p:clrMapOvr>
     <a:masterClrMapping/>
   </p:clrMapOvr>
-  <p:timing>
-    <p:tnLst>
-      <p:par>
-        <p:cTn id="1" dur="indefinite" restart="never" nodeType="tmRoot"/>
-      </p:par>
-    </p:tnLst>
-  </p:timing>
+</p:sld>
+</file>
+
+<file path=ppt/slides/slide19.xml><?xml version="1.0" encoding="utf-8"?>
+<p:sld xmlns:a="http://schemas.openxmlformats.org/drawingml/2006/main" xmlns:r="http://schemas.openxmlformats.org/officeDocument/2006/relationships" xmlns:p="http://schemas.openxmlformats.org/presentationml/2006/main">
+  <p:cSld>
+    <p:spTree>
+      <p:nvGrpSpPr>
+        <p:cNvPr id="1" name=""/>
+        <p:cNvGrpSpPr/>
+        <p:nvPr/>
+      </p:nvGrpSpPr>
+      <p:grpSpPr>
+        <a:xfrm>
+          <a:off x="0" y="0"/>
+          <a:ext cx="0" cy="0"/>
+          <a:chOff x="0" y="0"/>
+          <a:chExt cx="0" cy="0"/>
+        </a:xfrm>
+      </p:grpSpPr>
+      <p:sp>
+        <p:nvSpPr>
+          <p:cNvPr id="2" name="Slide Number Placeholder 1"/>
+          <p:cNvSpPr>
+            <a:spLocks noGrp="1"/>
+          </p:cNvSpPr>
+          <p:nvPr>
+            <p:ph type="sldNum" sz="quarter" idx="12"/>
+          </p:nvPr>
+        </p:nvSpPr>
+        <p:spPr/>
+        <p:txBody>
+          <a:bodyPr/>
+          <a:lstStyle/>
+          <a:p>
+            <a:fld id="{48BFE786-7E0B-46A5-A806-7914E4A415D7}" type="slidenum">
+              <a:rPr lang="en-US" smtClean="0"/>
+              <a:pPr/>
+              <a:t>19</a:t>
+            </a:fld>
+            <a:endParaRPr lang="en-US"/>
+          </a:p>
+        </p:txBody>
+      </p:sp>
+      <p:sp>
+        <p:nvSpPr>
+          <p:cNvPr id="5" name="Rectangle 4"/>
+          <p:cNvSpPr/>
+          <p:nvPr/>
+        </p:nvSpPr>
+        <p:spPr>
+          <a:xfrm>
+            <a:off x="1785918" y="357166"/>
+            <a:ext cx="5447325" cy="5816977"/>
+          </a:xfrm>
+          <a:prstGeom prst="rect">
+            <a:avLst/>
+          </a:prstGeom>
+          <a:noFill/>
+        </p:spPr>
+        <p:txBody>
+          <a:bodyPr wrap="none" lIns="91440" tIns="45720" rIns="91440" bIns="45720">
+            <a:spAutoFit/>
+          </a:bodyPr>
+          <a:lstStyle/>
+          <a:p>
+            <a:pPr algn="ctr"/>
+            <a:r>
+              <a:rPr lang="en-US" sz="6200" b="1" cap="none" spc="0" dirty="0" smtClean="0">
+                <a:ln w="1905"/>
+                <a:gradFill>
+                  <a:gsLst>
+                    <a:gs pos="0">
+                      <a:schemeClr val="accent6">
+                        <a:shade val="20000"/>
+                        <a:satMod val="200000"/>
+                      </a:schemeClr>
+                    </a:gs>
+                    <a:gs pos="78000">
+                      <a:schemeClr val="accent6">
+                        <a:tint val="90000"/>
+                        <a:shade val="89000"/>
+                        <a:satMod val="220000"/>
+                      </a:schemeClr>
+                    </a:gs>
+                    <a:gs pos="100000">
+                      <a:schemeClr val="accent6">
+                        <a:tint val="12000"/>
+                        <a:satMod val="255000"/>
+                      </a:schemeClr>
+                    </a:gs>
+                  </a:gsLst>
+                  <a:lin ang="5400000"/>
+                </a:gradFill>
+                <a:effectLst>
+                  <a:innerShdw blurRad="69850" dist="43180" dir="5400000">
+                    <a:srgbClr val="000000">
+                      <a:alpha val="65000"/>
+                    </a:srgbClr>
+                  </a:innerShdw>
+                </a:effectLst>
+              </a:rPr>
+              <a:t>Samples for  </a:t>
+            </a:r>
+          </a:p>
+          <a:p>
+            <a:pPr algn="ctr"/>
+            <a:r>
+              <a:rPr lang="en-US" sz="6200" b="1" cap="none" spc="0" dirty="0" smtClean="0">
+                <a:ln w="1905"/>
+                <a:gradFill>
+                  <a:gsLst>
+                    <a:gs pos="0">
+                      <a:schemeClr val="accent6">
+                        <a:shade val="20000"/>
+                        <a:satMod val="200000"/>
+                      </a:schemeClr>
+                    </a:gs>
+                    <a:gs pos="78000">
+                      <a:schemeClr val="accent6">
+                        <a:tint val="90000"/>
+                        <a:shade val="89000"/>
+                        <a:satMod val="220000"/>
+                      </a:schemeClr>
+                    </a:gs>
+                    <a:gs pos="100000">
+                      <a:schemeClr val="accent6">
+                        <a:tint val="12000"/>
+                        <a:satMod val="255000"/>
+                      </a:schemeClr>
+                    </a:gs>
+                  </a:gsLst>
+                  <a:lin ang="5400000"/>
+                </a:gradFill>
+                <a:effectLst>
+                  <a:innerShdw blurRad="69850" dist="43180" dir="5400000">
+                    <a:srgbClr val="000000">
+                      <a:alpha val="65000"/>
+                    </a:srgbClr>
+                  </a:innerShdw>
+                </a:effectLst>
+              </a:rPr>
+              <a:t>side view</a:t>
+            </a:r>
+          </a:p>
+          <a:p>
+            <a:pPr algn="ctr"/>
+            <a:endParaRPr lang="en-IN" sz="6200" b="1" dirty="0" smtClean="0">
+              <a:ln w="1905"/>
+              <a:gradFill>
+                <a:gsLst>
+                  <a:gs pos="0">
+                    <a:schemeClr val="accent6">
+                      <a:shade val="20000"/>
+                      <a:satMod val="200000"/>
+                    </a:schemeClr>
+                  </a:gs>
+                  <a:gs pos="78000">
+                    <a:schemeClr val="accent6">
+                      <a:tint val="90000"/>
+                      <a:shade val="89000"/>
+                      <a:satMod val="220000"/>
+                    </a:schemeClr>
+                  </a:gs>
+                  <a:gs pos="100000">
+                    <a:schemeClr val="accent6">
+                      <a:tint val="12000"/>
+                      <a:satMod val="255000"/>
+                    </a:schemeClr>
+                  </a:gs>
+                </a:gsLst>
+                <a:lin ang="5400000"/>
+              </a:gradFill>
+              <a:effectLst>
+                <a:innerShdw blurRad="69850" dist="43180" dir="5400000">
+                  <a:srgbClr val="000000">
+                    <a:alpha val="65000"/>
+                  </a:srgbClr>
+                </a:innerShdw>
+              </a:effectLst>
+            </a:endParaRPr>
+          </a:p>
+          <a:p>
+            <a:pPr algn="ctr"/>
+            <a:r>
+              <a:rPr lang="en-IN" sz="6200" b="1" cap="none" spc="0" dirty="0" smtClean="0">
+                <a:ln w="1905"/>
+                <a:gradFill>
+                  <a:gsLst>
+                    <a:gs pos="0">
+                      <a:schemeClr val="accent6">
+                        <a:shade val="20000"/>
+                        <a:satMod val="200000"/>
+                      </a:schemeClr>
+                    </a:gs>
+                    <a:gs pos="78000">
+                      <a:schemeClr val="accent6">
+                        <a:tint val="90000"/>
+                        <a:shade val="89000"/>
+                        <a:satMod val="220000"/>
+                      </a:schemeClr>
+                    </a:gs>
+                    <a:gs pos="100000">
+                      <a:schemeClr val="accent6">
+                        <a:tint val="12000"/>
+                        <a:satMod val="255000"/>
+                      </a:schemeClr>
+                    </a:gs>
+                  </a:gsLst>
+                  <a:lin ang="5400000"/>
+                </a:gradFill>
+                <a:effectLst>
+                  <a:innerShdw blurRad="69850" dist="43180" dir="5400000">
+                    <a:srgbClr val="000000">
+                      <a:alpha val="65000"/>
+                    </a:srgbClr>
+                  </a:innerShdw>
+                </a:effectLst>
+              </a:rPr>
+              <a:t>&amp;</a:t>
+            </a:r>
+          </a:p>
+          <a:p>
+            <a:pPr algn="ctr"/>
+            <a:endParaRPr lang="en-IN" sz="6200" b="1" dirty="0" smtClean="0">
+              <a:ln w="1905"/>
+              <a:gradFill>
+                <a:gsLst>
+                  <a:gs pos="0">
+                    <a:schemeClr val="accent6">
+                      <a:shade val="20000"/>
+                      <a:satMod val="200000"/>
+                    </a:schemeClr>
+                  </a:gs>
+                  <a:gs pos="78000">
+                    <a:schemeClr val="accent6">
+                      <a:tint val="90000"/>
+                      <a:shade val="89000"/>
+                      <a:satMod val="220000"/>
+                    </a:schemeClr>
+                  </a:gs>
+                  <a:gs pos="100000">
+                    <a:schemeClr val="accent6">
+                      <a:tint val="12000"/>
+                      <a:satMod val="255000"/>
+                    </a:schemeClr>
+                  </a:gs>
+                </a:gsLst>
+                <a:lin ang="5400000"/>
+              </a:gradFill>
+              <a:effectLst>
+                <a:innerShdw blurRad="69850" dist="43180" dir="5400000">
+                  <a:srgbClr val="000000">
+                    <a:alpha val="65000"/>
+                  </a:srgbClr>
+                </a:innerShdw>
+              </a:effectLst>
+            </a:endParaRPr>
+          </a:p>
+          <a:p>
+            <a:pPr algn="ctr"/>
+            <a:r>
+              <a:rPr lang="en-IN" sz="6200" b="1" cap="none" spc="0" dirty="0" smtClean="0">
+                <a:ln w="1905"/>
+                <a:gradFill>
+                  <a:gsLst>
+                    <a:gs pos="0">
+                      <a:schemeClr val="accent6">
+                        <a:shade val="20000"/>
+                        <a:satMod val="200000"/>
+                      </a:schemeClr>
+                    </a:gs>
+                    <a:gs pos="78000">
+                      <a:schemeClr val="accent6">
+                        <a:tint val="90000"/>
+                        <a:shade val="89000"/>
+                        <a:satMod val="220000"/>
+                      </a:schemeClr>
+                    </a:gs>
+                    <a:gs pos="100000">
+                      <a:schemeClr val="accent6">
+                        <a:tint val="12000"/>
+                        <a:satMod val="255000"/>
+                      </a:schemeClr>
+                    </a:gs>
+                  </a:gsLst>
+                  <a:lin ang="5400000"/>
+                </a:gradFill>
+                <a:effectLst>
+                  <a:innerShdw blurRad="69850" dist="43180" dir="5400000">
+                    <a:srgbClr val="000000">
+                      <a:alpha val="65000"/>
+                    </a:srgbClr>
+                  </a:innerShdw>
+                </a:effectLst>
+              </a:rPr>
+              <a:t>Specials Cases</a:t>
+            </a:r>
+            <a:endParaRPr lang="en-US" sz="6200" b="1" cap="none" spc="0" dirty="0">
+              <a:ln w="1905"/>
+              <a:gradFill>
+                <a:gsLst>
+                  <a:gs pos="0">
+                    <a:schemeClr val="accent6">
+                      <a:shade val="20000"/>
+                      <a:satMod val="200000"/>
+                    </a:schemeClr>
+                  </a:gs>
+                  <a:gs pos="78000">
+                    <a:schemeClr val="accent6">
+                      <a:tint val="90000"/>
+                      <a:shade val="89000"/>
+                      <a:satMod val="220000"/>
+                    </a:schemeClr>
+                  </a:gs>
+                  <a:gs pos="100000">
+                    <a:schemeClr val="accent6">
+                      <a:tint val="12000"/>
+                      <a:satMod val="255000"/>
+                    </a:schemeClr>
+                  </a:gs>
+                </a:gsLst>
+                <a:lin ang="5400000"/>
+              </a:gradFill>
+              <a:effectLst>
+                <a:innerShdw blurRad="69850" dist="43180" dir="5400000">
+                  <a:srgbClr val="000000">
+                    <a:alpha val="65000"/>
+                  </a:srgbClr>
+                </a:innerShdw>
+              </a:effectLst>
+            </a:endParaRPr>
+          </a:p>
+        </p:txBody>
+      </p:sp>
+    </p:spTree>
+  </p:cSld>
+  <p:clrMapOvr>
+    <a:masterClrMapping/>
+  </p:clrMapOvr>
 </p:sld>
 </file>
 
@@ -7407,7 +8236,7 @@
     </p:spTree>
     <p:extLst>
       <p:ext uri="{BB962C8B-B14F-4D97-AF65-F5344CB8AC3E}">
-        <p14:creationId xmlns="" xmlns:p14="http://schemas.microsoft.com/office/powerpoint/2010/main" val="3713094117"/>
+        <p14:creationId xmlns:p14="http://schemas.microsoft.com/office/powerpoint/2010/main" xmlns="" val="3713094117"/>
       </p:ext>
     </p:extLst>
   </p:cSld>
@@ -7421,6 +8250,1052 @@
       </p:par>
     </p:tnLst>
   </p:timing>
+</p:sld>
+</file>
+
+<file path=ppt/slides/slide20.xml><?xml version="1.0" encoding="utf-8"?>
+<p:sld xmlns:a="http://schemas.openxmlformats.org/drawingml/2006/main" xmlns:r="http://schemas.openxmlformats.org/officeDocument/2006/relationships" xmlns:p="http://schemas.openxmlformats.org/presentationml/2006/main">
+  <p:cSld>
+    <p:spTree>
+      <p:nvGrpSpPr>
+        <p:cNvPr id="1" name=""/>
+        <p:cNvGrpSpPr/>
+        <p:nvPr/>
+      </p:nvGrpSpPr>
+      <p:grpSpPr>
+        <a:xfrm>
+          <a:off x="0" y="0"/>
+          <a:ext cx="0" cy="0"/>
+          <a:chOff x="0" y="0"/>
+          <a:chExt cx="0" cy="0"/>
+        </a:xfrm>
+      </p:grpSpPr>
+      <p:sp>
+        <p:nvSpPr>
+          <p:cNvPr id="2" name="Slide Number Placeholder 1"/>
+          <p:cNvSpPr>
+            <a:spLocks noGrp="1"/>
+          </p:cNvSpPr>
+          <p:nvPr>
+            <p:ph type="sldNum" sz="quarter" idx="12"/>
+          </p:nvPr>
+        </p:nvSpPr>
+        <p:spPr/>
+        <p:txBody>
+          <a:bodyPr/>
+          <a:lstStyle/>
+          <a:p>
+            <a:fld id="{48BFE786-7E0B-46A5-A806-7914E4A415D7}" type="slidenum">
+              <a:rPr lang="en-US" smtClean="0"/>
+              <a:pPr/>
+              <a:t>20</a:t>
+            </a:fld>
+            <a:endParaRPr lang="en-US"/>
+          </a:p>
+        </p:txBody>
+      </p:sp>
+      <p:pic>
+        <p:nvPicPr>
+          <p:cNvPr id="5" name="Picture 2" descr="E:\Major\final\input\10.jpg"/>
+          <p:cNvPicPr>
+            <a:picLocks noChangeAspect="1" noChangeArrowheads="1"/>
+          </p:cNvPicPr>
+          <p:nvPr/>
+        </p:nvPicPr>
+        <p:blipFill>
+          <a:blip r:embed="rId2" cstate="print"/>
+          <a:srcRect/>
+          <a:stretch>
+            <a:fillRect/>
+          </a:stretch>
+        </p:blipFill>
+        <p:spPr bwMode="auto">
+          <a:xfrm>
+            <a:off x="2500298" y="428604"/>
+            <a:ext cx="4429156" cy="5766818"/>
+          </a:xfrm>
+          <a:prstGeom prst="rect">
+            <a:avLst/>
+          </a:prstGeom>
+          <a:noFill/>
+        </p:spPr>
+      </p:pic>
+    </p:spTree>
+  </p:cSld>
+  <p:clrMapOvr>
+    <a:masterClrMapping/>
+  </p:clrMapOvr>
+</p:sld>
+</file>
+
+<file path=ppt/slides/slide21.xml><?xml version="1.0" encoding="utf-8"?>
+<p:sld xmlns:a="http://schemas.openxmlformats.org/drawingml/2006/main" xmlns:r="http://schemas.openxmlformats.org/officeDocument/2006/relationships" xmlns:p="http://schemas.openxmlformats.org/presentationml/2006/main">
+  <p:cSld>
+    <p:spTree>
+      <p:nvGrpSpPr>
+        <p:cNvPr id="1" name=""/>
+        <p:cNvGrpSpPr/>
+        <p:nvPr/>
+      </p:nvGrpSpPr>
+      <p:grpSpPr>
+        <a:xfrm>
+          <a:off x="0" y="0"/>
+          <a:ext cx="0" cy="0"/>
+          <a:chOff x="0" y="0"/>
+          <a:chExt cx="0" cy="0"/>
+        </a:xfrm>
+      </p:grpSpPr>
+      <p:sp>
+        <p:nvSpPr>
+          <p:cNvPr id="2" name="Slide Number Placeholder 1"/>
+          <p:cNvSpPr>
+            <a:spLocks noGrp="1"/>
+          </p:cNvSpPr>
+          <p:nvPr>
+            <p:ph type="sldNum" sz="quarter" idx="12"/>
+          </p:nvPr>
+        </p:nvSpPr>
+        <p:spPr/>
+        <p:txBody>
+          <a:bodyPr/>
+          <a:lstStyle/>
+          <a:p>
+            <a:fld id="{48BFE786-7E0B-46A5-A806-7914E4A415D7}" type="slidenum">
+              <a:rPr lang="en-US" smtClean="0"/>
+              <a:pPr/>
+              <a:t>21</a:t>
+            </a:fld>
+            <a:endParaRPr lang="en-US"/>
+          </a:p>
+        </p:txBody>
+      </p:sp>
+      <p:pic>
+        <p:nvPicPr>
+          <p:cNvPr id="2050" name="Picture 2" descr="E:\Major\final\input\8.jpg"/>
+          <p:cNvPicPr>
+            <a:picLocks noChangeAspect="1" noChangeArrowheads="1"/>
+          </p:cNvPicPr>
+          <p:nvPr/>
+        </p:nvPicPr>
+        <p:blipFill>
+          <a:blip r:embed="rId2" cstate="print"/>
+          <a:srcRect/>
+          <a:stretch>
+            <a:fillRect/>
+          </a:stretch>
+        </p:blipFill>
+        <p:spPr bwMode="auto">
+          <a:xfrm>
+            <a:off x="2500298" y="785794"/>
+            <a:ext cx="3357586" cy="5171272"/>
+          </a:xfrm>
+          <a:prstGeom prst="rect">
+            <a:avLst/>
+          </a:prstGeom>
+          <a:noFill/>
+        </p:spPr>
+      </p:pic>
+    </p:spTree>
+  </p:cSld>
+  <p:clrMapOvr>
+    <a:masterClrMapping/>
+  </p:clrMapOvr>
+</p:sld>
+</file>
+
+<file path=ppt/slides/slide22.xml><?xml version="1.0" encoding="utf-8"?>
+<p:sld xmlns:a="http://schemas.openxmlformats.org/drawingml/2006/main" xmlns:r="http://schemas.openxmlformats.org/officeDocument/2006/relationships" xmlns:p="http://schemas.openxmlformats.org/presentationml/2006/main">
+  <p:cSld>
+    <p:spTree>
+      <p:nvGrpSpPr>
+        <p:cNvPr id="1" name=""/>
+        <p:cNvGrpSpPr/>
+        <p:nvPr/>
+      </p:nvGrpSpPr>
+      <p:grpSpPr>
+        <a:xfrm>
+          <a:off x="0" y="0"/>
+          <a:ext cx="0" cy="0"/>
+          <a:chOff x="0" y="0"/>
+          <a:chExt cx="0" cy="0"/>
+        </a:xfrm>
+      </p:grpSpPr>
+      <p:sp>
+        <p:nvSpPr>
+          <p:cNvPr id="2" name="Slide Number Placeholder 1"/>
+          <p:cNvSpPr>
+            <a:spLocks noGrp="1"/>
+          </p:cNvSpPr>
+          <p:nvPr>
+            <p:ph type="sldNum" sz="quarter" idx="12"/>
+          </p:nvPr>
+        </p:nvSpPr>
+        <p:spPr/>
+        <p:txBody>
+          <a:bodyPr/>
+          <a:lstStyle/>
+          <a:p>
+            <a:fld id="{48BFE786-7E0B-46A5-A806-7914E4A415D7}" type="slidenum">
+              <a:rPr lang="en-US" smtClean="0"/>
+              <a:pPr/>
+              <a:t>22</a:t>
+            </a:fld>
+            <a:endParaRPr lang="en-US"/>
+          </a:p>
+        </p:txBody>
+      </p:sp>
+      <p:pic>
+        <p:nvPicPr>
+          <p:cNvPr id="3074" name="Picture 2" descr="E:\Major\final\input\12.jpg"/>
+          <p:cNvPicPr>
+            <a:picLocks noChangeAspect="1" noChangeArrowheads="1"/>
+          </p:cNvPicPr>
+          <p:nvPr/>
+        </p:nvPicPr>
+        <p:blipFill>
+          <a:blip r:embed="rId2" cstate="print"/>
+          <a:srcRect/>
+          <a:stretch>
+            <a:fillRect/>
+          </a:stretch>
+        </p:blipFill>
+        <p:spPr bwMode="auto">
+          <a:xfrm>
+            <a:off x="2571736" y="500042"/>
+            <a:ext cx="4286280" cy="5572164"/>
+          </a:xfrm>
+          <a:prstGeom prst="rect">
+            <a:avLst/>
+          </a:prstGeom>
+          <a:noFill/>
+        </p:spPr>
+      </p:pic>
+    </p:spTree>
+  </p:cSld>
+  <p:clrMapOvr>
+    <a:masterClrMapping/>
+  </p:clrMapOvr>
+</p:sld>
+</file>
+
+<file path=ppt/slides/slide23.xml><?xml version="1.0" encoding="utf-8"?>
+<p:sld xmlns:a="http://schemas.openxmlformats.org/drawingml/2006/main" xmlns:r="http://schemas.openxmlformats.org/officeDocument/2006/relationships" xmlns:p="http://schemas.openxmlformats.org/presentationml/2006/main">
+  <p:cSld>
+    <p:spTree>
+      <p:nvGrpSpPr>
+        <p:cNvPr id="1" name=""/>
+        <p:cNvGrpSpPr/>
+        <p:nvPr/>
+      </p:nvGrpSpPr>
+      <p:grpSpPr>
+        <a:xfrm>
+          <a:off x="0" y="0"/>
+          <a:ext cx="0" cy="0"/>
+          <a:chOff x="0" y="0"/>
+          <a:chExt cx="0" cy="0"/>
+        </a:xfrm>
+      </p:grpSpPr>
+      <p:sp>
+        <p:nvSpPr>
+          <p:cNvPr id="2" name="Slide Number Placeholder 1"/>
+          <p:cNvSpPr>
+            <a:spLocks noGrp="1"/>
+          </p:cNvSpPr>
+          <p:nvPr>
+            <p:ph type="sldNum" sz="quarter" idx="12"/>
+          </p:nvPr>
+        </p:nvSpPr>
+        <p:spPr/>
+        <p:txBody>
+          <a:bodyPr/>
+          <a:lstStyle/>
+          <a:p>
+            <a:fld id="{48BFE786-7E0B-46A5-A806-7914E4A415D7}" type="slidenum">
+              <a:rPr lang="en-US" smtClean="0"/>
+              <a:pPr/>
+              <a:t>23</a:t>
+            </a:fld>
+            <a:endParaRPr lang="en-US"/>
+          </a:p>
+        </p:txBody>
+      </p:sp>
+      <p:pic>
+        <p:nvPicPr>
+          <p:cNvPr id="4098" name="Picture 2" descr="E:\Major\final\input\13.jpg"/>
+          <p:cNvPicPr>
+            <a:picLocks noChangeAspect="1" noChangeArrowheads="1"/>
+          </p:cNvPicPr>
+          <p:nvPr/>
+        </p:nvPicPr>
+        <p:blipFill>
+          <a:blip r:embed="rId2" cstate="print"/>
+          <a:srcRect/>
+          <a:stretch>
+            <a:fillRect/>
+          </a:stretch>
+        </p:blipFill>
+        <p:spPr bwMode="auto">
+          <a:xfrm>
+            <a:off x="1785918" y="1071546"/>
+            <a:ext cx="6443879" cy="4671147"/>
+          </a:xfrm>
+          <a:prstGeom prst="rect">
+            <a:avLst/>
+          </a:prstGeom>
+          <a:noFill/>
+        </p:spPr>
+      </p:pic>
+    </p:spTree>
+  </p:cSld>
+  <p:clrMapOvr>
+    <a:masterClrMapping/>
+  </p:clrMapOvr>
+</p:sld>
+</file>
+
+<file path=ppt/slides/slide24.xml><?xml version="1.0" encoding="utf-8"?>
+<p:sld xmlns:a="http://schemas.openxmlformats.org/drawingml/2006/main" xmlns:r="http://schemas.openxmlformats.org/officeDocument/2006/relationships" xmlns:p="http://schemas.openxmlformats.org/presentationml/2006/main">
+  <p:cSld>
+    <p:spTree>
+      <p:nvGrpSpPr>
+        <p:cNvPr id="1" name=""/>
+        <p:cNvGrpSpPr/>
+        <p:nvPr/>
+      </p:nvGrpSpPr>
+      <p:grpSpPr>
+        <a:xfrm>
+          <a:off x="0" y="0"/>
+          <a:ext cx="0" cy="0"/>
+          <a:chOff x="0" y="0"/>
+          <a:chExt cx="0" cy="0"/>
+        </a:xfrm>
+      </p:grpSpPr>
+      <p:sp>
+        <p:nvSpPr>
+          <p:cNvPr id="2" name="Slide Number Placeholder 1"/>
+          <p:cNvSpPr>
+            <a:spLocks noGrp="1"/>
+          </p:cNvSpPr>
+          <p:nvPr>
+            <p:ph type="sldNum" sz="quarter" idx="12"/>
+          </p:nvPr>
+        </p:nvSpPr>
+        <p:spPr/>
+        <p:txBody>
+          <a:bodyPr/>
+          <a:lstStyle/>
+          <a:p>
+            <a:fld id="{48BFE786-7E0B-46A5-A806-7914E4A415D7}" type="slidenum">
+              <a:rPr lang="en-US" smtClean="0"/>
+              <a:pPr/>
+              <a:t>24</a:t>
+            </a:fld>
+            <a:endParaRPr lang="en-US"/>
+          </a:p>
+        </p:txBody>
+      </p:sp>
+      <p:sp>
+        <p:nvSpPr>
+          <p:cNvPr id="5" name="Rectangle 4"/>
+          <p:cNvSpPr/>
+          <p:nvPr/>
+        </p:nvSpPr>
+        <p:spPr>
+          <a:xfrm>
+            <a:off x="-214346" y="714356"/>
+            <a:ext cx="9521637" cy="5632311"/>
+          </a:xfrm>
+          <a:prstGeom prst="rect">
+            <a:avLst/>
+          </a:prstGeom>
+          <a:noFill/>
+        </p:spPr>
+        <p:txBody>
+          <a:bodyPr wrap="square" lIns="91440" tIns="45720" rIns="91440" bIns="45720">
+            <a:spAutoFit/>
+          </a:bodyPr>
+          <a:lstStyle/>
+          <a:p>
+            <a:pPr algn="ctr"/>
+            <a:r>
+              <a:rPr lang="en-IN" sz="7200" b="1" dirty="0" smtClean="0">
+                <a:ln w="1905"/>
+                <a:gradFill>
+                  <a:gsLst>
+                    <a:gs pos="0">
+                      <a:schemeClr val="accent6">
+                        <a:shade val="20000"/>
+                        <a:satMod val="200000"/>
+                      </a:schemeClr>
+                    </a:gs>
+                    <a:gs pos="78000">
+                      <a:schemeClr val="accent6">
+                        <a:tint val="90000"/>
+                        <a:shade val="89000"/>
+                        <a:satMod val="220000"/>
+                      </a:schemeClr>
+                    </a:gs>
+                    <a:gs pos="100000">
+                      <a:schemeClr val="accent6">
+                        <a:tint val="12000"/>
+                        <a:satMod val="255000"/>
+                      </a:schemeClr>
+                    </a:gs>
+                  </a:gsLst>
+                  <a:lin ang="5400000"/>
+                </a:gradFill>
+                <a:effectLst>
+                  <a:innerShdw blurRad="69850" dist="43180" dir="5400000">
+                    <a:srgbClr val="000000">
+                      <a:alpha val="65000"/>
+                    </a:srgbClr>
+                  </a:innerShdw>
+                </a:effectLst>
+              </a:rPr>
+              <a:t>Text Extraction </a:t>
+            </a:r>
+          </a:p>
+          <a:p>
+            <a:pPr algn="ctr"/>
+            <a:r>
+              <a:rPr lang="en-IN" sz="7200" b="1" dirty="0" smtClean="0">
+                <a:ln w="1905"/>
+                <a:gradFill>
+                  <a:gsLst>
+                    <a:gs pos="0">
+                      <a:schemeClr val="accent6">
+                        <a:shade val="20000"/>
+                        <a:satMod val="200000"/>
+                      </a:schemeClr>
+                    </a:gs>
+                    <a:gs pos="78000">
+                      <a:schemeClr val="accent6">
+                        <a:tint val="90000"/>
+                        <a:shade val="89000"/>
+                        <a:satMod val="220000"/>
+                      </a:schemeClr>
+                    </a:gs>
+                    <a:gs pos="100000">
+                      <a:schemeClr val="accent6">
+                        <a:tint val="12000"/>
+                        <a:satMod val="255000"/>
+                      </a:schemeClr>
+                    </a:gs>
+                  </a:gsLst>
+                  <a:lin ang="5400000"/>
+                </a:gradFill>
+                <a:effectLst>
+                  <a:innerShdw blurRad="69850" dist="43180" dir="5400000">
+                    <a:srgbClr val="000000">
+                      <a:alpha val="65000"/>
+                    </a:srgbClr>
+                  </a:innerShdw>
+                </a:effectLst>
+              </a:rPr>
+              <a:t>Using </a:t>
+            </a:r>
+          </a:p>
+          <a:p>
+            <a:pPr algn="ctr"/>
+            <a:r>
+              <a:rPr lang="en-IN" sz="7200" b="1" dirty="0" smtClean="0">
+                <a:ln w="1905"/>
+                <a:gradFill>
+                  <a:gsLst>
+                    <a:gs pos="0">
+                      <a:schemeClr val="accent6">
+                        <a:shade val="20000"/>
+                        <a:satMod val="200000"/>
+                      </a:schemeClr>
+                    </a:gs>
+                    <a:gs pos="78000">
+                      <a:schemeClr val="accent6">
+                        <a:tint val="90000"/>
+                        <a:shade val="89000"/>
+                        <a:satMod val="220000"/>
+                      </a:schemeClr>
+                    </a:gs>
+                    <a:gs pos="100000">
+                      <a:schemeClr val="accent6">
+                        <a:tint val="12000"/>
+                        <a:satMod val="255000"/>
+                      </a:schemeClr>
+                    </a:gs>
+                  </a:gsLst>
+                  <a:lin ang="5400000"/>
+                </a:gradFill>
+                <a:effectLst>
+                  <a:innerShdw blurRad="69850" dist="43180" dir="5400000">
+                    <a:srgbClr val="000000">
+                      <a:alpha val="65000"/>
+                    </a:srgbClr>
+                  </a:innerShdw>
+                </a:effectLst>
+              </a:rPr>
+              <a:t>Optical Character Recognition</a:t>
+            </a:r>
+          </a:p>
+          <a:p>
+            <a:pPr algn="ctr"/>
+            <a:r>
+              <a:rPr lang="en-IN" sz="7200" b="1" cap="none" spc="0" dirty="0" smtClean="0">
+                <a:ln w="1905"/>
+                <a:gradFill>
+                  <a:gsLst>
+                    <a:gs pos="0">
+                      <a:schemeClr val="accent6">
+                        <a:shade val="20000"/>
+                        <a:satMod val="200000"/>
+                      </a:schemeClr>
+                    </a:gs>
+                    <a:gs pos="78000">
+                      <a:schemeClr val="accent6">
+                        <a:tint val="90000"/>
+                        <a:shade val="89000"/>
+                        <a:satMod val="220000"/>
+                      </a:schemeClr>
+                    </a:gs>
+                    <a:gs pos="100000">
+                      <a:schemeClr val="accent6">
+                        <a:tint val="12000"/>
+                        <a:satMod val="255000"/>
+                      </a:schemeClr>
+                    </a:gs>
+                  </a:gsLst>
+                  <a:lin ang="5400000"/>
+                </a:gradFill>
+                <a:effectLst>
+                  <a:innerShdw blurRad="69850" dist="43180" dir="5400000">
+                    <a:srgbClr val="000000">
+                      <a:alpha val="65000"/>
+                    </a:srgbClr>
+                  </a:innerShdw>
+                </a:effectLst>
+              </a:rPr>
+              <a:t>(OCR)</a:t>
+            </a:r>
+            <a:endParaRPr lang="en-US" sz="7200" b="1" cap="none" spc="0" dirty="0">
+              <a:ln w="1905"/>
+              <a:gradFill>
+                <a:gsLst>
+                  <a:gs pos="0">
+                    <a:schemeClr val="accent6">
+                      <a:shade val="20000"/>
+                      <a:satMod val="200000"/>
+                    </a:schemeClr>
+                  </a:gs>
+                  <a:gs pos="78000">
+                    <a:schemeClr val="accent6">
+                      <a:tint val="90000"/>
+                      <a:shade val="89000"/>
+                      <a:satMod val="220000"/>
+                    </a:schemeClr>
+                  </a:gs>
+                  <a:gs pos="100000">
+                    <a:schemeClr val="accent6">
+                      <a:tint val="12000"/>
+                      <a:satMod val="255000"/>
+                    </a:schemeClr>
+                  </a:gs>
+                </a:gsLst>
+                <a:lin ang="5400000"/>
+              </a:gradFill>
+              <a:effectLst>
+                <a:innerShdw blurRad="69850" dist="43180" dir="5400000">
+                  <a:srgbClr val="000000">
+                    <a:alpha val="65000"/>
+                  </a:srgbClr>
+                </a:innerShdw>
+              </a:effectLst>
+            </a:endParaRPr>
+          </a:p>
+        </p:txBody>
+      </p:sp>
+    </p:spTree>
+  </p:cSld>
+  <p:clrMapOvr>
+    <a:masterClrMapping/>
+  </p:clrMapOvr>
+</p:sld>
+</file>
+
+<file path=ppt/slides/slide25.xml><?xml version="1.0" encoding="utf-8"?>
+<p:sld xmlns:a="http://schemas.openxmlformats.org/drawingml/2006/main" xmlns:r="http://schemas.openxmlformats.org/officeDocument/2006/relationships" xmlns:p="http://schemas.openxmlformats.org/presentationml/2006/main">
+  <p:cSld>
+    <p:spTree>
+      <p:nvGrpSpPr>
+        <p:cNvPr id="1" name=""/>
+        <p:cNvGrpSpPr/>
+        <p:nvPr/>
+      </p:nvGrpSpPr>
+      <p:grpSpPr>
+        <a:xfrm>
+          <a:off x="0" y="0"/>
+          <a:ext cx="0" cy="0"/>
+          <a:chOff x="0" y="0"/>
+          <a:chExt cx="0" cy="0"/>
+        </a:xfrm>
+      </p:grpSpPr>
+      <p:sp>
+        <p:nvSpPr>
+          <p:cNvPr id="2" name="Slide Number Placeholder 1"/>
+          <p:cNvSpPr>
+            <a:spLocks noGrp="1"/>
+          </p:cNvSpPr>
+          <p:nvPr>
+            <p:ph type="sldNum" sz="quarter" idx="12"/>
+          </p:nvPr>
+        </p:nvSpPr>
+        <p:spPr/>
+        <p:txBody>
+          <a:bodyPr/>
+          <a:lstStyle/>
+          <a:p>
+            <a:fld id="{48BFE786-7E0B-46A5-A806-7914E4A415D7}" type="slidenum">
+              <a:rPr lang="en-US" smtClean="0"/>
+              <a:pPr/>
+              <a:t>25</a:t>
+            </a:fld>
+            <a:endParaRPr lang="en-US"/>
+          </a:p>
+        </p:txBody>
+      </p:sp>
+      <p:sp>
+        <p:nvSpPr>
+          <p:cNvPr id="5" name="Rectangle 4"/>
+          <p:cNvSpPr/>
+          <p:nvPr/>
+        </p:nvSpPr>
+        <p:spPr>
+          <a:xfrm>
+            <a:off x="2428860" y="0"/>
+            <a:ext cx="3874202" cy="923330"/>
+          </a:xfrm>
+          <a:prstGeom prst="rect">
+            <a:avLst/>
+          </a:prstGeom>
+          <a:noFill/>
+        </p:spPr>
+        <p:txBody>
+          <a:bodyPr wrap="none" lIns="91440" tIns="45720" rIns="91440" bIns="45720">
+            <a:spAutoFit/>
+          </a:bodyPr>
+          <a:lstStyle/>
+          <a:p>
+            <a:pPr algn="ctr"/>
+            <a:r>
+              <a:rPr lang="en-US" sz="5400" b="1" cap="none" spc="0" dirty="0" smtClean="0">
+                <a:ln w="1905"/>
+                <a:gradFill>
+                  <a:gsLst>
+                    <a:gs pos="0">
+                      <a:schemeClr val="accent6">
+                        <a:shade val="20000"/>
+                        <a:satMod val="200000"/>
+                      </a:schemeClr>
+                    </a:gs>
+                    <a:gs pos="78000">
+                      <a:schemeClr val="accent6">
+                        <a:tint val="90000"/>
+                        <a:shade val="89000"/>
+                        <a:satMod val="220000"/>
+                      </a:schemeClr>
+                    </a:gs>
+                    <a:gs pos="100000">
+                      <a:schemeClr val="accent6">
+                        <a:tint val="12000"/>
+                        <a:satMod val="255000"/>
+                      </a:schemeClr>
+                    </a:gs>
+                  </a:gsLst>
+                  <a:lin ang="5400000"/>
+                </a:gradFill>
+                <a:effectLst>
+                  <a:innerShdw blurRad="69850" dist="43180" dir="5400000">
+                    <a:srgbClr val="000000">
+                      <a:alpha val="65000"/>
+                    </a:srgbClr>
+                  </a:innerShdw>
+                </a:effectLst>
+              </a:rPr>
+              <a:t>What’s Left</a:t>
+            </a:r>
+            <a:endParaRPr lang="en-US" sz="5400" b="1" cap="none" spc="0" dirty="0">
+              <a:ln w="1905"/>
+              <a:gradFill>
+                <a:gsLst>
+                  <a:gs pos="0">
+                    <a:schemeClr val="accent6">
+                      <a:shade val="20000"/>
+                      <a:satMod val="200000"/>
+                    </a:schemeClr>
+                  </a:gs>
+                  <a:gs pos="78000">
+                    <a:schemeClr val="accent6">
+                      <a:tint val="90000"/>
+                      <a:shade val="89000"/>
+                      <a:satMod val="220000"/>
+                    </a:schemeClr>
+                  </a:gs>
+                  <a:gs pos="100000">
+                    <a:schemeClr val="accent6">
+                      <a:tint val="12000"/>
+                      <a:satMod val="255000"/>
+                    </a:schemeClr>
+                  </a:gs>
+                </a:gsLst>
+                <a:lin ang="5400000"/>
+              </a:gradFill>
+              <a:effectLst>
+                <a:innerShdw blurRad="69850" dist="43180" dir="5400000">
+                  <a:srgbClr val="000000">
+                    <a:alpha val="65000"/>
+                  </a:srgbClr>
+                </a:innerShdw>
+              </a:effectLst>
+            </a:endParaRPr>
+          </a:p>
+        </p:txBody>
+      </p:sp>
+      <p:sp>
+        <p:nvSpPr>
+          <p:cNvPr id="6" name="TextBox 5"/>
+          <p:cNvSpPr txBox="1"/>
+          <p:nvPr/>
+        </p:nvSpPr>
+        <p:spPr>
+          <a:xfrm>
+            <a:off x="500034" y="994856"/>
+            <a:ext cx="8143932" cy="5863144"/>
+          </a:xfrm>
+          <a:prstGeom prst="rect">
+            <a:avLst/>
+          </a:prstGeom>
+          <a:noFill/>
+        </p:spPr>
+        <p:txBody>
+          <a:bodyPr wrap="square" rtlCol="0">
+            <a:spAutoFit/>
+          </a:bodyPr>
+          <a:lstStyle/>
+          <a:p>
+            <a:pPr algn="just">
+              <a:buFont typeface="Wingdings" pitchFamily="2" charset="2"/>
+              <a:buChar char="Ø"/>
+            </a:pPr>
+            <a:r>
+              <a:rPr lang="en-IN" sz="2500" dirty="0" smtClean="0">
+                <a:solidFill>
+                  <a:srgbClr val="002060"/>
+                </a:solidFill>
+              </a:rPr>
+              <a:t> Working on the accuracy of number pate detection for multiple riders.</a:t>
+            </a:r>
+          </a:p>
+          <a:p>
+            <a:pPr algn="just">
+              <a:buFont typeface="Wingdings" pitchFamily="2" charset="2"/>
+              <a:buChar char="Ø"/>
+            </a:pPr>
+            <a:r>
+              <a:rPr lang="en-IN" sz="2500" dirty="0" smtClean="0">
+                <a:solidFill>
+                  <a:srgbClr val="002060"/>
+                </a:solidFill>
+              </a:rPr>
+              <a:t> </a:t>
+            </a:r>
+            <a:r>
+              <a:rPr lang="en-IN" sz="2500" dirty="0" smtClean="0">
+                <a:solidFill>
+                  <a:srgbClr val="002060"/>
+                </a:solidFill>
+              </a:rPr>
+              <a:t>Working for improvements in  text recognition.</a:t>
+            </a:r>
+          </a:p>
+          <a:p>
+            <a:pPr algn="just">
+              <a:buFont typeface="Wingdings" pitchFamily="2" charset="2"/>
+              <a:buChar char="Ø"/>
+            </a:pPr>
+            <a:r>
+              <a:rPr lang="en-IN" sz="2500" dirty="0" smtClean="0">
+                <a:solidFill>
+                  <a:srgbClr val="002060"/>
+                </a:solidFill>
+              </a:rPr>
+              <a:t> </a:t>
+            </a:r>
+            <a:r>
+              <a:rPr lang="en-IN" sz="2500" dirty="0" err="1" smtClean="0">
+                <a:solidFill>
+                  <a:srgbClr val="002060"/>
+                </a:solidFill>
+              </a:rPr>
+              <a:t>Challan</a:t>
+            </a:r>
+            <a:r>
+              <a:rPr lang="en-IN" sz="2500" dirty="0" smtClean="0">
+                <a:solidFill>
+                  <a:srgbClr val="002060"/>
+                </a:solidFill>
+              </a:rPr>
+              <a:t> generation using the output of the text recognition and informing the owner for the </a:t>
+            </a:r>
+            <a:r>
+              <a:rPr lang="en-IN" sz="2500" dirty="0" err="1" smtClean="0">
+                <a:solidFill>
+                  <a:srgbClr val="002060"/>
+                </a:solidFill>
+              </a:rPr>
+              <a:t>challan</a:t>
+            </a:r>
+            <a:r>
+              <a:rPr lang="en-IN" sz="2500" dirty="0" smtClean="0">
+                <a:solidFill>
+                  <a:srgbClr val="002060"/>
+                </a:solidFill>
+              </a:rPr>
+              <a:t> generated via email. The email will contain an attachment of photograph of rider without helmet which will be the proof and reason for </a:t>
+            </a:r>
+            <a:r>
+              <a:rPr lang="en-IN" sz="2500" dirty="0" err="1" smtClean="0">
+                <a:solidFill>
+                  <a:srgbClr val="002060"/>
+                </a:solidFill>
+              </a:rPr>
+              <a:t>challan</a:t>
+            </a:r>
+            <a:r>
+              <a:rPr lang="en-IN" sz="2500" dirty="0" smtClean="0">
+                <a:solidFill>
+                  <a:srgbClr val="002060"/>
+                </a:solidFill>
+              </a:rPr>
+              <a:t> generation.</a:t>
+            </a:r>
+          </a:p>
+          <a:p>
+            <a:pPr algn="just">
+              <a:buFont typeface="Wingdings" pitchFamily="2" charset="2"/>
+              <a:buChar char="Ø"/>
+            </a:pPr>
+            <a:r>
+              <a:rPr lang="en-IN" sz="2500" dirty="0" smtClean="0">
+                <a:solidFill>
+                  <a:srgbClr val="002060"/>
+                </a:solidFill>
+              </a:rPr>
+              <a:t> </a:t>
+            </a:r>
+            <a:r>
+              <a:rPr lang="en-IN" sz="2500" dirty="0" smtClean="0">
+                <a:solidFill>
+                  <a:srgbClr val="002060"/>
+                </a:solidFill>
+              </a:rPr>
+              <a:t>After </a:t>
+            </a:r>
+            <a:r>
+              <a:rPr lang="en-IN" sz="2500" dirty="0" err="1" smtClean="0">
+                <a:solidFill>
+                  <a:srgbClr val="002060"/>
+                </a:solidFill>
+              </a:rPr>
+              <a:t>challan</a:t>
+            </a:r>
+            <a:r>
+              <a:rPr lang="en-IN" sz="2500" dirty="0" smtClean="0">
+                <a:solidFill>
+                  <a:srgbClr val="002060"/>
+                </a:solidFill>
+              </a:rPr>
+              <a:t> generation payment of </a:t>
+            </a:r>
+            <a:r>
+              <a:rPr lang="en-IN" sz="2500" dirty="0" err="1" smtClean="0">
+                <a:solidFill>
+                  <a:srgbClr val="002060"/>
+                </a:solidFill>
+              </a:rPr>
+              <a:t>challan</a:t>
+            </a:r>
+            <a:r>
+              <a:rPr lang="en-IN" sz="2500" dirty="0" smtClean="0">
+                <a:solidFill>
+                  <a:srgbClr val="002060"/>
+                </a:solidFill>
+              </a:rPr>
+              <a:t> using direct link or from the designed software.</a:t>
+            </a:r>
+          </a:p>
+          <a:p>
+            <a:pPr algn="just">
+              <a:buFont typeface="Wingdings" pitchFamily="2" charset="2"/>
+              <a:buChar char="Ø"/>
+            </a:pPr>
+            <a:r>
+              <a:rPr lang="en-IN" sz="2500" dirty="0" smtClean="0">
+                <a:solidFill>
+                  <a:srgbClr val="002060"/>
+                </a:solidFill>
+              </a:rPr>
+              <a:t> </a:t>
+            </a:r>
+            <a:r>
+              <a:rPr lang="en-IN" sz="2500" dirty="0" smtClean="0">
+                <a:solidFill>
+                  <a:srgbClr val="002060"/>
+                </a:solidFill>
+              </a:rPr>
+              <a:t>Software development for payment of </a:t>
+            </a:r>
+            <a:r>
+              <a:rPr lang="en-IN" sz="2500" dirty="0" err="1" smtClean="0">
+                <a:solidFill>
+                  <a:srgbClr val="002060"/>
+                </a:solidFill>
+              </a:rPr>
+              <a:t>challan</a:t>
+            </a:r>
+            <a:r>
+              <a:rPr lang="en-IN" sz="2500" dirty="0" smtClean="0">
+                <a:solidFill>
+                  <a:srgbClr val="002060"/>
+                </a:solidFill>
+              </a:rPr>
+              <a:t> generated using OTP login.</a:t>
+            </a:r>
+          </a:p>
+          <a:p>
+            <a:pPr algn="just">
+              <a:buFont typeface="Wingdings" pitchFamily="2" charset="2"/>
+              <a:buChar char="Ø"/>
+            </a:pPr>
+            <a:r>
+              <a:rPr lang="en-IN" sz="2500" dirty="0" smtClean="0">
+                <a:solidFill>
+                  <a:srgbClr val="002060"/>
+                </a:solidFill>
+              </a:rPr>
+              <a:t> </a:t>
+            </a:r>
+            <a:r>
+              <a:rPr lang="en-IN" sz="2500" dirty="0" smtClean="0">
+                <a:solidFill>
+                  <a:srgbClr val="002060"/>
+                </a:solidFill>
+              </a:rPr>
+              <a:t>Final Report.</a:t>
+            </a:r>
+          </a:p>
+          <a:p>
+            <a:pPr algn="just">
+              <a:buFont typeface="Wingdings" pitchFamily="2" charset="2"/>
+              <a:buChar char="Ø"/>
+            </a:pPr>
+            <a:endParaRPr lang="en-IN" sz="2500" dirty="0" smtClean="0">
+              <a:solidFill>
+                <a:srgbClr val="002060"/>
+              </a:solidFill>
+            </a:endParaRPr>
+          </a:p>
+        </p:txBody>
+      </p:sp>
+    </p:spTree>
+  </p:cSld>
+  <p:clrMapOvr>
+    <a:masterClrMapping/>
+  </p:clrMapOvr>
+</p:sld>
+</file>
+
+<file path=ppt/slides/slide26.xml><?xml version="1.0" encoding="utf-8"?>
+<p:sld xmlns:a="http://schemas.openxmlformats.org/drawingml/2006/main" xmlns:r="http://schemas.openxmlformats.org/officeDocument/2006/relationships" xmlns:p="http://schemas.openxmlformats.org/presentationml/2006/main">
+  <p:cSld>
+    <p:spTree>
+      <p:nvGrpSpPr>
+        <p:cNvPr id="1" name=""/>
+        <p:cNvGrpSpPr/>
+        <p:nvPr/>
+      </p:nvGrpSpPr>
+      <p:grpSpPr>
+        <a:xfrm>
+          <a:off x="0" y="0"/>
+          <a:ext cx="0" cy="0"/>
+          <a:chOff x="0" y="0"/>
+          <a:chExt cx="0" cy="0"/>
+        </a:xfrm>
+      </p:grpSpPr>
+      <p:sp>
+        <p:nvSpPr>
+          <p:cNvPr id="2" name="Slide Number Placeholder 1"/>
+          <p:cNvSpPr>
+            <a:spLocks noGrp="1"/>
+          </p:cNvSpPr>
+          <p:nvPr>
+            <p:ph type="sldNum" sz="quarter" idx="12"/>
+          </p:nvPr>
+        </p:nvSpPr>
+        <p:spPr/>
+        <p:txBody>
+          <a:bodyPr/>
+          <a:lstStyle/>
+          <a:p>
+            <a:fld id="{48BFE786-7E0B-46A5-A806-7914E4A415D7}" type="slidenum">
+              <a:rPr lang="en-US" smtClean="0"/>
+              <a:pPr/>
+              <a:t>26</a:t>
+            </a:fld>
+            <a:endParaRPr lang="en-US"/>
+          </a:p>
+        </p:txBody>
+      </p:sp>
+      <p:sp>
+        <p:nvSpPr>
+          <p:cNvPr id="3" name="Title 2"/>
+          <p:cNvSpPr>
+            <a:spLocks noGrp="1"/>
+          </p:cNvSpPr>
+          <p:nvPr>
+            <p:ph type="title"/>
+          </p:nvPr>
+        </p:nvSpPr>
+        <p:spPr>
+          <a:xfrm>
+            <a:off x="1142976" y="2357430"/>
+            <a:ext cx="5786478" cy="1143000"/>
+          </a:xfrm>
+        </p:spPr>
+        <p:txBody>
+          <a:bodyPr/>
+          <a:lstStyle/>
+          <a:p>
+            <a:pPr>
+              <a:buNone/>
+            </a:pPr>
+            <a:r>
+              <a:rPr lang="en-IN" sz="7200" dirty="0" smtClean="0">
+                <a:solidFill>
+                  <a:srgbClr val="C00000"/>
+                </a:solidFill>
+              </a:rPr>
+              <a:t>Thank You</a:t>
+            </a:r>
+            <a:endParaRPr lang="en-US" sz="7200" dirty="0">
+              <a:solidFill>
+                <a:srgbClr val="C00000"/>
+              </a:solidFill>
+            </a:endParaRPr>
+          </a:p>
+        </p:txBody>
+      </p:sp>
+    </p:spTree>
+  </p:cSld>
+  <p:clrMapOvr>
+    <a:masterClrMapping/>
+  </p:clrMapOvr>
 </p:sld>
 </file>
 
@@ -7818,7 +9693,7 @@
           <a:blip r:embed="rId2" cstate="print">
             <a:extLst>
               <a:ext uri="{28A0092B-C50C-407E-A947-70E740481C1C}">
-                <a14:useLocalDpi xmlns="" xmlns:a14="http://schemas.microsoft.com/office/drawing/2010/main" val="0"/>
+                <a14:useLocalDpi xmlns:a14="http://schemas.microsoft.com/office/drawing/2010/main" xmlns="" val="0"/>
               </a:ext>
             </a:extLst>
           </a:blip>
@@ -7838,7 +9713,7 @@
           <a:noFill/>
           <a:extLst>
             <a:ext uri="{909E8E84-426E-40DD-AFC4-6F175D3DCCD1}">
-              <a14:hiddenFill xmlns="" xmlns:a14="http://schemas.microsoft.com/office/drawing/2010/main">
+              <a14:hiddenFill xmlns:a14="http://schemas.microsoft.com/office/drawing/2010/main" xmlns="">
                 <a:solidFill>
                   <a:srgbClr val="FFFFFF"/>
                 </a:solidFill>
@@ -7850,7 +9725,7 @@
     </p:spTree>
     <p:extLst>
       <p:ext uri="{BB962C8B-B14F-4D97-AF65-F5344CB8AC3E}">
-        <p14:creationId xmlns="" xmlns:p14="http://schemas.microsoft.com/office/powerpoint/2010/main" val="745076924"/>
+        <p14:creationId xmlns:p14="http://schemas.microsoft.com/office/powerpoint/2010/main" xmlns="" val="745076924"/>
       </p:ext>
     </p:extLst>
   </p:cSld>
@@ -8583,7 +10458,7 @@
     </p:spTree>
     <p:extLst>
       <p:ext uri="{BB962C8B-B14F-4D97-AF65-F5344CB8AC3E}">
-        <p14:creationId xmlns="" xmlns:p14="http://schemas.microsoft.com/office/powerpoint/2010/main" val="1950569689"/>
+        <p14:creationId xmlns:p14="http://schemas.microsoft.com/office/powerpoint/2010/main" xmlns="" val="1950569689"/>
       </p:ext>
     </p:extLst>
   </p:cSld>
@@ -8947,7 +10822,7 @@
           <a:blip r:embed="rId2" cstate="print">
             <a:extLst>
               <a:ext uri="{28A0092B-C50C-407E-A947-70E740481C1C}">
-                <a14:useLocalDpi xmlns="" xmlns:a14="http://schemas.microsoft.com/office/drawing/2010/main" val="0"/>
+                <a14:useLocalDpi xmlns:a14="http://schemas.microsoft.com/office/drawing/2010/main" xmlns="" val="0"/>
               </a:ext>
             </a:extLst>
           </a:blip>
@@ -8967,7 +10842,7 @@
           <a:noFill/>
           <a:extLst>
             <a:ext uri="{909E8E84-426E-40DD-AFC4-6F175D3DCCD1}">
-              <a14:hiddenFill xmlns="" xmlns:a14="http://schemas.microsoft.com/office/drawing/2010/main">
+              <a14:hiddenFill xmlns:a14="http://schemas.microsoft.com/office/drawing/2010/main" xmlns="">
                 <a:solidFill>
                   <a:srgbClr val="FFFFFF"/>
                 </a:solidFill>

</xml_diff>